<commit_message>
added RT workflow bis
</commit_message>
<xml_diff>
--- a/vector_images/rt_workflow.pptx
+++ b/vector_images/rt_workflow.pptx
@@ -6,6 +6,7 @@
   </p:sldMasterIdLst>
   <p:sldIdLst>
     <p:sldId id="256" r:id="rId2"/>
+    <p:sldId id="257" r:id="rId3"/>
   </p:sldIdLst>
   <p:sldSz cx="12192000" cy="6858000"/>
   <p:notesSz cx="6858000" cy="9144000"/>
@@ -3893,6 +3894,849 @@
 </p:sld>
 </file>
 
+<file path=ppt/slides/slide2.xml><?xml version="1.0" encoding="utf-8"?>
+<p:sld xmlns:a="http://schemas.openxmlformats.org/drawingml/2006/main" xmlns:r="http://schemas.openxmlformats.org/officeDocument/2006/relationships" xmlns:p="http://schemas.openxmlformats.org/presentationml/2006/main">
+  <p:cSld>
+    <p:spTree>
+      <p:nvGrpSpPr>
+        <p:cNvPr id="1" name=""/>
+        <p:cNvGrpSpPr/>
+        <p:nvPr/>
+      </p:nvGrpSpPr>
+      <p:grpSpPr>
+        <a:xfrm>
+          <a:off x="0" y="0"/>
+          <a:ext cx="0" cy="0"/>
+          <a:chOff x="0" y="0"/>
+          <a:chExt cx="0" cy="0"/>
+        </a:xfrm>
+      </p:grpSpPr>
+      <p:grpSp>
+        <p:nvGrpSpPr>
+          <p:cNvPr id="12" name="Group 11">
+            <a:extLst>
+              <a:ext uri="{FF2B5EF4-FFF2-40B4-BE49-F238E27FC236}">
+                <a16:creationId xmlns:a16="http://schemas.microsoft.com/office/drawing/2014/main" id="{994E4B02-BD8B-F196-A65A-436D509A1F4D}"/>
+              </a:ext>
+            </a:extLst>
+          </p:cNvPr>
+          <p:cNvGrpSpPr/>
+          <p:nvPr/>
+        </p:nvGrpSpPr>
+        <p:grpSpPr>
+          <a:xfrm>
+            <a:off x="5132965" y="1857981"/>
+            <a:ext cx="5078461" cy="1716933"/>
+            <a:chOff x="5132964" y="1857981"/>
+            <a:chExt cx="5078461" cy="1716933"/>
+          </a:xfrm>
+        </p:grpSpPr>
+        <p:sp>
+          <p:nvSpPr>
+            <p:cNvPr id="10" name="Rectangle 9">
+              <a:extLst>
+                <a:ext uri="{FF2B5EF4-FFF2-40B4-BE49-F238E27FC236}">
+                  <a16:creationId xmlns:a16="http://schemas.microsoft.com/office/drawing/2014/main" id="{02FAD684-89F5-076B-0DCB-D27E2B9E0F1B}"/>
+                </a:ext>
+              </a:extLst>
+            </p:cNvPr>
+            <p:cNvSpPr/>
+            <p:nvPr/>
+          </p:nvSpPr>
+          <p:spPr>
+            <a:xfrm>
+              <a:off x="5132964" y="1857981"/>
+              <a:ext cx="5078461" cy="1716933"/>
+            </a:xfrm>
+            <a:prstGeom prst="rect">
+              <a:avLst/>
+            </a:prstGeom>
+          </p:spPr>
+          <p:style>
+            <a:lnRef idx="2">
+              <a:schemeClr val="accent2">
+                <a:shade val="15000"/>
+              </a:schemeClr>
+            </a:lnRef>
+            <a:fillRef idx="1">
+              <a:schemeClr val="accent2"/>
+            </a:fillRef>
+            <a:effectRef idx="0">
+              <a:schemeClr val="accent2"/>
+            </a:effectRef>
+            <a:fontRef idx="minor">
+              <a:schemeClr val="lt1"/>
+            </a:fontRef>
+          </p:style>
+          <p:txBody>
+            <a:bodyPr rtlCol="0" anchor="ctr"/>
+            <a:lstStyle/>
+            <a:p>
+              <a:pPr algn="ctr"/>
+              <a:r>
+                <a:rPr lang="en-US" b="1" u="sng" dirty="0"/>
+                <a:t>Optimization</a:t>
+              </a:r>
+            </a:p>
+            <a:p>
+              <a:pPr algn="ctr"/>
+              <a:endParaRPr lang="en-US" dirty="0"/>
+            </a:p>
+            <a:p>
+              <a:pPr algn="ctr"/>
+              <a:endParaRPr lang="en-US" dirty="0"/>
+            </a:p>
+            <a:p>
+              <a:pPr algn="ctr"/>
+              <a:endParaRPr lang="en-US" dirty="0"/>
+            </a:p>
+            <a:p>
+              <a:pPr algn="ctr"/>
+              <a:endParaRPr lang="en-US" dirty="0"/>
+            </a:p>
+          </p:txBody>
+        </p:sp>
+        <p:sp>
+          <p:nvSpPr>
+            <p:cNvPr id="5" name="Rectangle: Rounded Corners 4">
+              <a:extLst>
+                <a:ext uri="{FF2B5EF4-FFF2-40B4-BE49-F238E27FC236}">
+                  <a16:creationId xmlns:a16="http://schemas.microsoft.com/office/drawing/2014/main" id="{C2A35CEB-7E75-3A73-C20D-A47BF14B489A}"/>
+                </a:ext>
+              </a:extLst>
+            </p:cNvPr>
+            <p:cNvSpPr/>
+            <p:nvPr/>
+          </p:nvSpPr>
+          <p:spPr>
+            <a:xfrm>
+              <a:off x="8721205" y="2748034"/>
+              <a:ext cx="1368359" cy="650971"/>
+            </a:xfrm>
+            <a:prstGeom prst="roundRect">
+              <a:avLst/>
+            </a:prstGeom>
+          </p:spPr>
+          <p:style>
+            <a:lnRef idx="2">
+              <a:schemeClr val="accent4">
+                <a:shade val="15000"/>
+              </a:schemeClr>
+            </a:lnRef>
+            <a:fillRef idx="1">
+              <a:schemeClr val="accent4"/>
+            </a:fillRef>
+            <a:effectRef idx="0">
+              <a:schemeClr val="accent4"/>
+            </a:effectRef>
+            <a:fontRef idx="minor">
+              <a:schemeClr val="lt1"/>
+            </a:fontRef>
+          </p:style>
+          <p:txBody>
+            <a:bodyPr rtlCol="0" anchor="ctr"/>
+            <a:lstStyle/>
+            <a:p>
+              <a:pPr algn="ctr"/>
+              <a:r>
+                <a:rPr lang="en-US" dirty="0"/>
+                <a:t>Leaf Sequencing</a:t>
+              </a:r>
+            </a:p>
+          </p:txBody>
+        </p:sp>
+        <p:sp>
+          <p:nvSpPr>
+            <p:cNvPr id="6" name="Rectangle: Rounded Corners 5">
+              <a:extLst>
+                <a:ext uri="{FF2B5EF4-FFF2-40B4-BE49-F238E27FC236}">
+                  <a16:creationId xmlns:a16="http://schemas.microsoft.com/office/drawing/2014/main" id="{B29E1959-9683-BA85-6D6F-FEAE798F0050}"/>
+                </a:ext>
+              </a:extLst>
+            </p:cNvPr>
+            <p:cNvSpPr/>
+            <p:nvPr/>
+          </p:nvSpPr>
+          <p:spPr>
+            <a:xfrm>
+              <a:off x="7108463" y="2748036"/>
+              <a:ext cx="1485092" cy="650972"/>
+            </a:xfrm>
+            <a:prstGeom prst="roundRect">
+              <a:avLst/>
+            </a:prstGeom>
+          </p:spPr>
+          <p:style>
+            <a:lnRef idx="2">
+              <a:schemeClr val="accent4">
+                <a:shade val="15000"/>
+              </a:schemeClr>
+            </a:lnRef>
+            <a:fillRef idx="1">
+              <a:schemeClr val="accent4"/>
+            </a:fillRef>
+            <a:effectRef idx="0">
+              <a:schemeClr val="accent4"/>
+            </a:effectRef>
+            <a:fontRef idx="minor">
+              <a:schemeClr val="lt1"/>
+            </a:fontRef>
+          </p:style>
+          <p:txBody>
+            <a:bodyPr rtlCol="0" anchor="ctr"/>
+            <a:lstStyle/>
+            <a:p>
+              <a:pPr algn="ctr"/>
+              <a:r>
+                <a:rPr lang="en-US" dirty="0"/>
+                <a:t>Fluence Map Optimization</a:t>
+              </a:r>
+            </a:p>
+          </p:txBody>
+        </p:sp>
+        <p:sp>
+          <p:nvSpPr>
+            <p:cNvPr id="7" name="Rectangle: Rounded Corners 6">
+              <a:extLst>
+                <a:ext uri="{FF2B5EF4-FFF2-40B4-BE49-F238E27FC236}">
+                  <a16:creationId xmlns:a16="http://schemas.microsoft.com/office/drawing/2014/main" id="{4F3FC85A-4D33-2F0F-CD97-4EE49CB66643}"/>
+                </a:ext>
+              </a:extLst>
+            </p:cNvPr>
+            <p:cNvSpPr/>
+            <p:nvPr/>
+          </p:nvSpPr>
+          <p:spPr>
+            <a:xfrm>
+              <a:off x="5261228" y="2538888"/>
+              <a:ext cx="1718972" cy="993371"/>
+            </a:xfrm>
+            <a:prstGeom prst="roundRect">
+              <a:avLst/>
+            </a:prstGeom>
+          </p:spPr>
+          <p:style>
+            <a:lnRef idx="2">
+              <a:schemeClr val="accent4">
+                <a:shade val="15000"/>
+              </a:schemeClr>
+            </a:lnRef>
+            <a:fillRef idx="1">
+              <a:schemeClr val="accent4"/>
+            </a:fillRef>
+            <a:effectRef idx="0">
+              <a:schemeClr val="accent4"/>
+            </a:effectRef>
+            <a:fontRef idx="minor">
+              <a:schemeClr val="lt1"/>
+            </a:fontRef>
+          </p:style>
+          <p:txBody>
+            <a:bodyPr rtlCol="0" anchor="ctr"/>
+            <a:lstStyle/>
+            <a:p>
+              <a:pPr algn="ctr"/>
+              <a:r>
+                <a:rPr lang="en-US" dirty="0"/>
+                <a:t>Beam Orientation Optimization</a:t>
+              </a:r>
+            </a:p>
+          </p:txBody>
+        </p:sp>
+      </p:grpSp>
+      <p:grpSp>
+        <p:nvGrpSpPr>
+          <p:cNvPr id="13" name="Group 12">
+            <a:extLst>
+              <a:ext uri="{FF2B5EF4-FFF2-40B4-BE49-F238E27FC236}">
+                <a16:creationId xmlns:a16="http://schemas.microsoft.com/office/drawing/2014/main" id="{D15A0AF8-7311-2658-5A58-1C9DC0A995C7}"/>
+              </a:ext>
+            </a:extLst>
+          </p:cNvPr>
+          <p:cNvGrpSpPr/>
+          <p:nvPr/>
+        </p:nvGrpSpPr>
+        <p:grpSpPr>
+          <a:xfrm>
+            <a:off x="83051" y="2003896"/>
+            <a:ext cx="4615409" cy="1425103"/>
+            <a:chOff x="83051" y="2003897"/>
+            <a:chExt cx="4615409" cy="1425103"/>
+          </a:xfrm>
+        </p:grpSpPr>
+        <p:sp>
+          <p:nvSpPr>
+            <p:cNvPr id="11" name="Rectangle 10">
+              <a:extLst>
+                <a:ext uri="{FF2B5EF4-FFF2-40B4-BE49-F238E27FC236}">
+                  <a16:creationId xmlns:a16="http://schemas.microsoft.com/office/drawing/2014/main" id="{0F4B9726-BECD-6B91-395B-E3A76A28977A}"/>
+                </a:ext>
+              </a:extLst>
+            </p:cNvPr>
+            <p:cNvSpPr/>
+            <p:nvPr/>
+          </p:nvSpPr>
+          <p:spPr>
+            <a:xfrm>
+              <a:off x="83051" y="2003897"/>
+              <a:ext cx="4615409" cy="1425103"/>
+            </a:xfrm>
+            <a:prstGeom prst="rect">
+              <a:avLst/>
+            </a:prstGeom>
+          </p:spPr>
+          <p:style>
+            <a:lnRef idx="2">
+              <a:schemeClr val="accent1">
+                <a:shade val="15000"/>
+              </a:schemeClr>
+            </a:lnRef>
+            <a:fillRef idx="1">
+              <a:schemeClr val="accent1"/>
+            </a:fillRef>
+            <a:effectRef idx="0">
+              <a:schemeClr val="accent1"/>
+            </a:effectRef>
+            <a:fontRef idx="minor">
+              <a:schemeClr val="lt1"/>
+            </a:fontRef>
+          </p:style>
+          <p:txBody>
+            <a:bodyPr rtlCol="0" anchor="ctr"/>
+            <a:lstStyle/>
+            <a:p>
+              <a:pPr algn="ctr"/>
+              <a:r>
+                <a:rPr lang="en-US" b="1" i="1" dirty="0"/>
+                <a:t>Inputs</a:t>
+              </a:r>
+            </a:p>
+            <a:p>
+              <a:pPr algn="ctr"/>
+              <a:endParaRPr lang="en-US" dirty="0"/>
+            </a:p>
+            <a:p>
+              <a:pPr algn="ctr"/>
+              <a:endParaRPr lang="en-US" dirty="0"/>
+            </a:p>
+            <a:p>
+              <a:pPr algn="ctr"/>
+              <a:endParaRPr lang="en-US" dirty="0"/>
+            </a:p>
+            <a:p>
+              <a:pPr algn="ctr"/>
+              <a:endParaRPr lang="en-US" dirty="0"/>
+            </a:p>
+          </p:txBody>
+        </p:sp>
+        <p:sp>
+          <p:nvSpPr>
+            <p:cNvPr id="4" name="Rectangle: Rounded Corners 3">
+              <a:extLst>
+                <a:ext uri="{FF2B5EF4-FFF2-40B4-BE49-F238E27FC236}">
+                  <a16:creationId xmlns:a16="http://schemas.microsoft.com/office/drawing/2014/main" id="{BAE8B970-D945-E813-D2D9-696B539CFF26}"/>
+                </a:ext>
+              </a:extLst>
+            </p:cNvPr>
+            <p:cNvSpPr/>
+            <p:nvPr/>
+          </p:nvSpPr>
+          <p:spPr>
+            <a:xfrm>
+              <a:off x="193038" y="2602121"/>
+              <a:ext cx="1651088" cy="575083"/>
+            </a:xfrm>
+            <a:prstGeom prst="roundRect">
+              <a:avLst/>
+            </a:prstGeom>
+          </p:spPr>
+          <p:style>
+            <a:lnRef idx="2">
+              <a:schemeClr val="accent5">
+                <a:shade val="15000"/>
+              </a:schemeClr>
+            </a:lnRef>
+            <a:fillRef idx="1">
+              <a:schemeClr val="accent5"/>
+            </a:fillRef>
+            <a:effectRef idx="0">
+              <a:schemeClr val="accent5"/>
+            </a:effectRef>
+            <a:fontRef idx="minor">
+              <a:schemeClr val="lt1"/>
+            </a:fontRef>
+          </p:style>
+          <p:txBody>
+            <a:bodyPr rtlCol="0" anchor="ctr"/>
+            <a:lstStyle/>
+            <a:p>
+              <a:pPr algn="ctr"/>
+              <a:r>
+                <a:rPr lang="en-US" i="1" dirty="0"/>
+                <a:t>Patient Scan</a:t>
+              </a:r>
+            </a:p>
+          </p:txBody>
+        </p:sp>
+        <p:sp>
+          <p:nvSpPr>
+            <p:cNvPr id="8" name="Rectangle: Rounded Corners 7">
+              <a:extLst>
+                <a:ext uri="{FF2B5EF4-FFF2-40B4-BE49-F238E27FC236}">
+                  <a16:creationId xmlns:a16="http://schemas.microsoft.com/office/drawing/2014/main" id="{CC5BCE02-4C65-44D8-1F06-7B8D7EC5653E}"/>
+                </a:ext>
+              </a:extLst>
+            </p:cNvPr>
+            <p:cNvSpPr/>
+            <p:nvPr/>
+          </p:nvSpPr>
+          <p:spPr>
+            <a:xfrm>
+              <a:off x="1922736" y="2454532"/>
+              <a:ext cx="2627096" cy="870259"/>
+            </a:xfrm>
+            <a:prstGeom prst="roundRect">
+              <a:avLst/>
+            </a:prstGeom>
+          </p:spPr>
+          <p:style>
+            <a:lnRef idx="2">
+              <a:schemeClr val="accent5">
+                <a:shade val="15000"/>
+              </a:schemeClr>
+            </a:lnRef>
+            <a:fillRef idx="1">
+              <a:schemeClr val="accent5"/>
+            </a:fillRef>
+            <a:effectRef idx="0">
+              <a:schemeClr val="accent5"/>
+            </a:effectRef>
+            <a:fontRef idx="minor">
+              <a:schemeClr val="lt1"/>
+            </a:fontRef>
+          </p:style>
+          <p:txBody>
+            <a:bodyPr rtlCol="0" anchor="ctr"/>
+            <a:lstStyle/>
+            <a:p>
+              <a:pPr algn="ctr"/>
+              <a:r>
+                <a:rPr lang="en-US" i="1" dirty="0"/>
+                <a:t>Structures Contouring</a:t>
+              </a:r>
+            </a:p>
+            <a:p>
+              <a:pPr algn="ctr"/>
+              <a:r>
+                <a:rPr lang="en-US" i="1" dirty="0"/>
+                <a:t>(PTV + OARs)</a:t>
+              </a:r>
+            </a:p>
+          </p:txBody>
+        </p:sp>
+      </p:grpSp>
+      <p:sp>
+        <p:nvSpPr>
+          <p:cNvPr id="9" name="Rectangle: Rounded Corners 8">
+            <a:extLst>
+              <a:ext uri="{FF2B5EF4-FFF2-40B4-BE49-F238E27FC236}">
+                <a16:creationId xmlns:a16="http://schemas.microsoft.com/office/drawing/2014/main" id="{35E766E6-BE9C-0FF7-3050-549CCB409418}"/>
+              </a:ext>
+            </a:extLst>
+          </p:cNvPr>
+          <p:cNvSpPr/>
+          <p:nvPr/>
+        </p:nvSpPr>
+        <p:spPr>
+          <a:xfrm>
+            <a:off x="10645930" y="2275355"/>
+            <a:ext cx="1463019" cy="882184"/>
+          </a:xfrm>
+          <a:prstGeom prst="roundRect">
+            <a:avLst/>
+          </a:prstGeom>
+        </p:spPr>
+        <p:style>
+          <a:lnRef idx="2">
+            <a:schemeClr val="accent6">
+              <a:shade val="15000"/>
+            </a:schemeClr>
+          </a:lnRef>
+          <a:fillRef idx="1">
+            <a:schemeClr val="accent6"/>
+          </a:fillRef>
+          <a:effectRef idx="0">
+            <a:schemeClr val="accent6"/>
+          </a:effectRef>
+          <a:fontRef idx="minor">
+            <a:schemeClr val="lt1"/>
+          </a:fontRef>
+        </p:style>
+        <p:txBody>
+          <a:bodyPr rtlCol="0" anchor="ctr"/>
+          <a:lstStyle/>
+          <a:p>
+            <a:pPr algn="ctr"/>
+            <a:r>
+              <a:rPr lang="en-US" b="1" i="1" dirty="0"/>
+              <a:t>Treatment Delivery</a:t>
+            </a:r>
+          </a:p>
+        </p:txBody>
+      </p:sp>
+      <p:cxnSp>
+        <p:nvCxnSpPr>
+          <p:cNvPr id="15" name="Straight Arrow Connector 14">
+            <a:extLst>
+              <a:ext uri="{FF2B5EF4-FFF2-40B4-BE49-F238E27FC236}">
+                <a16:creationId xmlns:a16="http://schemas.microsoft.com/office/drawing/2014/main" id="{3B7A077A-BB09-934D-48ED-5CCF50CBCE0D}"/>
+              </a:ext>
+            </a:extLst>
+          </p:cNvPr>
+          <p:cNvCxnSpPr>
+            <a:cxnSpLocks/>
+            <a:stCxn id="11" idx="3"/>
+            <a:endCxn id="10" idx="1"/>
+          </p:cNvCxnSpPr>
+          <p:nvPr/>
+        </p:nvCxnSpPr>
+        <p:spPr>
+          <a:xfrm>
+            <a:off x="4698460" y="2716448"/>
+            <a:ext cx="434505" cy="0"/>
+          </a:xfrm>
+          <a:prstGeom prst="straightConnector1">
+            <a:avLst/>
+          </a:prstGeom>
+          <a:ln w="76200">
+            <a:tailEnd type="triangle"/>
+          </a:ln>
+        </p:spPr>
+        <p:style>
+          <a:lnRef idx="1">
+            <a:schemeClr val="dk1"/>
+          </a:lnRef>
+          <a:fillRef idx="0">
+            <a:schemeClr val="dk1"/>
+          </a:fillRef>
+          <a:effectRef idx="0">
+            <a:schemeClr val="dk1"/>
+          </a:effectRef>
+          <a:fontRef idx="minor">
+            <a:schemeClr val="tx1"/>
+          </a:fontRef>
+        </p:style>
+      </p:cxnSp>
+      <p:cxnSp>
+        <p:nvCxnSpPr>
+          <p:cNvPr id="17" name="Straight Arrow Connector 16">
+            <a:extLst>
+              <a:ext uri="{FF2B5EF4-FFF2-40B4-BE49-F238E27FC236}">
+                <a16:creationId xmlns:a16="http://schemas.microsoft.com/office/drawing/2014/main" id="{F89C296F-88A3-29A4-9495-DA0711D9AE72}"/>
+              </a:ext>
+            </a:extLst>
+          </p:cNvPr>
+          <p:cNvCxnSpPr>
+            <a:cxnSpLocks/>
+            <a:stCxn id="10" idx="3"/>
+            <a:endCxn id="9" idx="1"/>
+          </p:cNvCxnSpPr>
+          <p:nvPr/>
+        </p:nvCxnSpPr>
+        <p:spPr>
+          <a:xfrm flipV="1">
+            <a:off x="10211426" y="2716447"/>
+            <a:ext cx="434504" cy="1"/>
+          </a:xfrm>
+          <a:prstGeom prst="straightConnector1">
+            <a:avLst/>
+          </a:prstGeom>
+          <a:ln w="76200">
+            <a:tailEnd type="triangle"/>
+          </a:ln>
+        </p:spPr>
+        <p:style>
+          <a:lnRef idx="1">
+            <a:schemeClr val="dk1"/>
+          </a:lnRef>
+          <a:fillRef idx="0">
+            <a:schemeClr val="dk1"/>
+          </a:fillRef>
+          <a:effectRef idx="0">
+            <a:schemeClr val="dk1"/>
+          </a:effectRef>
+          <a:fontRef idx="minor">
+            <a:schemeClr val="tx1"/>
+          </a:fontRef>
+        </p:style>
+      </p:cxnSp>
+      <p:cxnSp>
+        <p:nvCxnSpPr>
+          <p:cNvPr id="3" name="Straight Arrow Connector 2">
+            <a:extLst>
+              <a:ext uri="{FF2B5EF4-FFF2-40B4-BE49-F238E27FC236}">
+                <a16:creationId xmlns:a16="http://schemas.microsoft.com/office/drawing/2014/main" id="{0E2B2B23-2BB7-5BC6-0E46-E9BBC9AE46EA}"/>
+              </a:ext>
+            </a:extLst>
+          </p:cNvPr>
+          <p:cNvCxnSpPr>
+            <a:cxnSpLocks/>
+            <a:endCxn id="16" idx="2"/>
+          </p:cNvCxnSpPr>
+          <p:nvPr/>
+        </p:nvCxnSpPr>
+        <p:spPr>
+          <a:xfrm flipV="1">
+            <a:off x="5631793" y="2469853"/>
+            <a:ext cx="593387" cy="1217034"/>
+          </a:xfrm>
+          <a:prstGeom prst="straightConnector1">
+            <a:avLst/>
+          </a:prstGeom>
+          <a:ln w="76200">
+            <a:solidFill>
+              <a:srgbClr val="FF0000"/>
+            </a:solidFill>
+            <a:tailEnd type="triangle"/>
+          </a:ln>
+        </p:spPr>
+        <p:style>
+          <a:lnRef idx="1">
+            <a:schemeClr val="accent1"/>
+          </a:lnRef>
+          <a:fillRef idx="0">
+            <a:schemeClr val="accent1"/>
+          </a:fillRef>
+          <a:effectRef idx="0">
+            <a:schemeClr val="accent1"/>
+          </a:effectRef>
+          <a:fontRef idx="minor">
+            <a:schemeClr val="tx1"/>
+          </a:fontRef>
+        </p:style>
+      </p:cxnSp>
+      <p:sp>
+        <p:nvSpPr>
+          <p:cNvPr id="16" name="TextBox 15">
+            <a:extLst>
+              <a:ext uri="{FF2B5EF4-FFF2-40B4-BE49-F238E27FC236}">
+                <a16:creationId xmlns:a16="http://schemas.microsoft.com/office/drawing/2014/main" id="{551AB633-F663-2EAB-F6A0-3D20E19FE48F}"/>
+              </a:ext>
+            </a:extLst>
+          </p:cNvPr>
+          <p:cNvSpPr txBox="1"/>
+          <p:nvPr/>
+        </p:nvSpPr>
+        <p:spPr>
+          <a:xfrm>
+            <a:off x="5441568" y="2100521"/>
+            <a:ext cx="1567224" cy="369332"/>
+          </a:xfrm>
+          <a:prstGeom prst="rect">
+            <a:avLst/>
+          </a:prstGeom>
+          <a:solidFill>
+            <a:schemeClr val="bg1">
+              <a:alpha val="40000"/>
+            </a:schemeClr>
+          </a:solidFill>
+          <a:effectLst>
+            <a:softEdge rad="63500"/>
+          </a:effectLst>
+        </p:spPr>
+        <p:txBody>
+          <a:bodyPr wrap="none" rtlCol="0">
+            <a:spAutoFit/>
+          </a:bodyPr>
+          <a:lstStyle/>
+          <a:p>
+            <a:r>
+              <a:rPr lang="en-US" b="1" i="1" dirty="0">
+                <a:solidFill>
+                  <a:srgbClr val="FF0000"/>
+                </a:solidFill>
+              </a:rPr>
+              <a:t>Use Templates</a:t>
+            </a:r>
+          </a:p>
+        </p:txBody>
+      </p:sp>
+      <p:cxnSp>
+        <p:nvCxnSpPr>
+          <p:cNvPr id="18" name="Straight Arrow Connector 17">
+            <a:extLst>
+              <a:ext uri="{FF2B5EF4-FFF2-40B4-BE49-F238E27FC236}">
+                <a16:creationId xmlns:a16="http://schemas.microsoft.com/office/drawing/2014/main" id="{F1C37395-6971-E922-15DA-F39E9924997B}"/>
+              </a:ext>
+            </a:extLst>
+          </p:cNvPr>
+          <p:cNvCxnSpPr>
+            <a:cxnSpLocks/>
+            <a:endCxn id="19" idx="2"/>
+          </p:cNvCxnSpPr>
+          <p:nvPr/>
+        </p:nvCxnSpPr>
+        <p:spPr>
+          <a:xfrm flipV="1">
+            <a:off x="9124335" y="2780542"/>
+            <a:ext cx="376034" cy="751717"/>
+          </a:xfrm>
+          <a:prstGeom prst="straightConnector1">
+            <a:avLst/>
+          </a:prstGeom>
+          <a:ln w="76200">
+            <a:solidFill>
+              <a:srgbClr val="FF0000"/>
+            </a:solidFill>
+            <a:tailEnd type="triangle"/>
+          </a:ln>
+        </p:spPr>
+        <p:style>
+          <a:lnRef idx="1">
+            <a:schemeClr val="accent1"/>
+          </a:lnRef>
+          <a:fillRef idx="0">
+            <a:schemeClr val="accent1"/>
+          </a:fillRef>
+          <a:effectRef idx="0">
+            <a:schemeClr val="accent1"/>
+          </a:effectRef>
+          <a:fontRef idx="minor">
+            <a:schemeClr val="tx1"/>
+          </a:fontRef>
+        </p:style>
+      </p:cxnSp>
+      <p:sp>
+        <p:nvSpPr>
+          <p:cNvPr id="19" name="TextBox 18">
+            <a:extLst>
+              <a:ext uri="{FF2B5EF4-FFF2-40B4-BE49-F238E27FC236}">
+                <a16:creationId xmlns:a16="http://schemas.microsoft.com/office/drawing/2014/main" id="{77FB297A-D45B-8DB8-F0D5-7B78E6E7A178}"/>
+              </a:ext>
+            </a:extLst>
+          </p:cNvPr>
+          <p:cNvSpPr txBox="1"/>
+          <p:nvPr/>
+        </p:nvSpPr>
+        <p:spPr>
+          <a:xfrm>
+            <a:off x="8745996" y="1857212"/>
+            <a:ext cx="1508746" cy="923330"/>
+          </a:xfrm>
+          <a:prstGeom prst="rect">
+            <a:avLst/>
+          </a:prstGeom>
+          <a:solidFill>
+            <a:schemeClr val="bg1">
+              <a:alpha val="40000"/>
+            </a:schemeClr>
+          </a:solidFill>
+          <a:effectLst>
+            <a:softEdge rad="63500"/>
+          </a:effectLst>
+        </p:spPr>
+        <p:txBody>
+          <a:bodyPr wrap="none" rtlCol="0">
+            <a:spAutoFit/>
+          </a:bodyPr>
+          <a:lstStyle/>
+          <a:p>
+            <a:r>
+              <a:rPr lang="en-US" b="1" i="1" dirty="0">
+                <a:solidFill>
+                  <a:srgbClr val="FF0000"/>
+                </a:solidFill>
+              </a:rPr>
+              <a:t>Linear</a:t>
+            </a:r>
+          </a:p>
+          <a:p>
+            <a:r>
+              <a:rPr lang="en-US" b="1" i="1" dirty="0">
+                <a:solidFill>
+                  <a:srgbClr val="FF0000"/>
+                </a:solidFill>
+              </a:rPr>
+              <a:t>Programming</a:t>
+            </a:r>
+          </a:p>
+          <a:p>
+            <a:r>
+              <a:rPr lang="en-US" b="1" i="1" dirty="0">
+                <a:solidFill>
+                  <a:srgbClr val="FF0000"/>
+                </a:solidFill>
+              </a:rPr>
+              <a:t>Problem</a:t>
+            </a:r>
+          </a:p>
+        </p:txBody>
+      </p:sp>
+      <p:sp>
+        <p:nvSpPr>
+          <p:cNvPr id="24" name="Oval 23">
+            <a:extLst>
+              <a:ext uri="{FF2B5EF4-FFF2-40B4-BE49-F238E27FC236}">
+                <a16:creationId xmlns:a16="http://schemas.microsoft.com/office/drawing/2014/main" id="{B55EAECC-829A-5A13-D5F3-98161B74ABC0}"/>
+              </a:ext>
+            </a:extLst>
+          </p:cNvPr>
+          <p:cNvSpPr/>
+          <p:nvPr/>
+        </p:nvSpPr>
+        <p:spPr>
+          <a:xfrm>
+            <a:off x="7008792" y="2602120"/>
+            <a:ext cx="1708613" cy="972794"/>
+          </a:xfrm>
+          <a:prstGeom prst="ellipse">
+            <a:avLst/>
+          </a:prstGeom>
+          <a:noFill/>
+          <a:ln w="76200">
+            <a:solidFill>
+              <a:srgbClr val="FF0000"/>
+            </a:solidFill>
+          </a:ln>
+        </p:spPr>
+        <p:style>
+          <a:lnRef idx="2">
+            <a:schemeClr val="accent1">
+              <a:shade val="15000"/>
+            </a:schemeClr>
+          </a:lnRef>
+          <a:fillRef idx="1">
+            <a:schemeClr val="accent1"/>
+          </a:fillRef>
+          <a:effectRef idx="0">
+            <a:schemeClr val="accent1"/>
+          </a:effectRef>
+          <a:fontRef idx="minor">
+            <a:schemeClr val="lt1"/>
+          </a:fontRef>
+        </p:style>
+        <p:txBody>
+          <a:bodyPr rtlCol="0" anchor="ctr"/>
+          <a:lstStyle/>
+          <a:p>
+            <a:pPr algn="ctr"/>
+            <a:endParaRPr lang="en-US"/>
+          </a:p>
+        </p:txBody>
+      </p:sp>
+    </p:spTree>
+    <p:extLst>
+      <p:ext uri="{BB962C8B-B14F-4D97-AF65-F5344CB8AC3E}">
+        <p14:creationId xmlns:p14="http://schemas.microsoft.com/office/powerpoint/2010/main" val="759630964"/>
+      </p:ext>
+    </p:extLst>
+  </p:cSld>
+  <p:clrMapOvr>
+    <a:masterClrMapping/>
+  </p:clrMapOvr>
+</p:sld>
+</file>
+
 <file path=ppt/theme/theme1.xml><?xml version="1.0" encoding="utf-8"?>
 <a:theme xmlns:a="http://schemas.openxmlformats.org/drawingml/2006/main" name="Office Theme">
   <a:themeElements>

</xml_diff>